<commit_message>
Updated Demo 3 Slides
</commit_message>
<xml_diff>
--- a/MOCUIPlugin-Demo3.pptx
+++ b/MOCUIPlugin-Demo3.pptx
@@ -218,7 +218,7 @@
             <a:fld id="{A8ADFD5B-A66C-449C-B6E8-FB716D07777D}" type="datetimeFigureOut">
               <a:rPr lang="en-US" smtClean="0"/>
               <a:pPr/>
-              <a:t>4/8/2015</a:t>
+              <a:t>4/9/2015</a:t>
             </a:fld>
             <a:endParaRPr lang="en-US"/>
           </a:p>
@@ -858,7 +858,7 @@
                 </a:solidFill>
               </a:rPr>
               <a:pPr algn="ctr"/>
-              <a:t>4/8/2015</a:t>
+              <a:t>4/9/2015</a:t>
             </a:fld>
             <a:endParaRPr kumimoji="0" lang="en-US" sz="2000" dirty="0">
               <a:solidFill>
@@ -1057,7 +1057,7 @@
             <a:fld id="{E4606EA6-EFEA-4C30-9264-4F9291A5780D}" type="datetime1">
               <a:rPr kumimoji="0" lang="en-US" smtClean="0"/>
               <a:pPr/>
-              <a:t>4/8/2015</a:t>
+              <a:t>4/9/2015</a:t>
             </a:fld>
             <a:endParaRPr kumimoji="0" lang="en-US"/>
           </a:p>
@@ -1488,7 +1488,7 @@
             <a:fld id="{6FCF9F07-3BC7-4570-B054-79111B0A380C}" type="datetime1">
               <a:rPr kumimoji="0" lang="en-US" smtClean="0"/>
               <a:pPr/>
-              <a:t>4/8/2015</a:t>
+              <a:t>4/9/2015</a:t>
             </a:fld>
             <a:endParaRPr kumimoji="0" lang="en-US"/>
           </a:p>
@@ -1753,7 +1753,7 @@
             <a:fld id="{E4606EA6-EFEA-4C30-9264-4F9291A5780D}" type="datetime1">
               <a:rPr kumimoji="0" lang="en-US" smtClean="0"/>
               <a:pPr/>
-              <a:t>4/8/2015</a:t>
+              <a:t>4/9/2015</a:t>
             </a:fld>
             <a:endParaRPr kumimoji="0" lang="en-US"/>
           </a:p>
@@ -2008,7 +2008,7 @@
             <a:fld id="{E4606EA6-EFEA-4C30-9264-4F9291A5780D}" type="datetime1">
               <a:rPr kumimoji="0" lang="en-US" smtClean="0"/>
               <a:pPr/>
-              <a:t>4/8/2015</a:t>
+              <a:t>4/9/2015</a:t>
             </a:fld>
             <a:endParaRPr kumimoji="0" lang="en-US"/>
           </a:p>
@@ -2221,7 +2221,7 @@
             <a:fld id="{6DFADB5D-B7A0-47E3-AD2D-B1A6F8614213}" type="datetime1">
               <a:rPr kumimoji="0" lang="en-US" smtClean="0"/>
               <a:pPr/>
-              <a:t>4/8/2015</a:t>
+              <a:t>4/9/2015</a:t>
             </a:fld>
             <a:endParaRPr kumimoji="0" lang="en-US"/>
           </a:p>
@@ -2334,7 +2334,7 @@
             <a:fld id="{72968126-03FC-49C0-B9B8-2B561CCC3D90}" type="datetime1">
               <a:rPr kumimoji="0" lang="en-US" smtClean="0"/>
               <a:pPr/>
-              <a:t>4/8/2015</a:t>
+              <a:t>4/9/2015</a:t>
             </a:fld>
             <a:endParaRPr kumimoji="0" lang="en-US"/>
           </a:p>
@@ -2487,7 +2487,7 @@
             <a:fld id="{F49A8198-4617-485E-9585-4840B69DBBA6}" type="datetime1">
               <a:rPr kumimoji="0" lang="en-US" smtClean="0"/>
               <a:pPr/>
-              <a:t>4/8/2015</a:t>
+              <a:t>4/9/2015</a:t>
             </a:fld>
             <a:endParaRPr kumimoji="0" lang="en-US"/>
           </a:p>
@@ -3076,7 +3076,7 @@
             <a:fld id="{E4606EA6-EFEA-4C30-9264-4F9291A5780D}" type="datetime1">
               <a:rPr kumimoji="0" lang="en-US" smtClean="0"/>
               <a:pPr/>
-              <a:t>4/8/2015</a:t>
+              <a:t>4/9/2015</a:t>
             </a:fld>
             <a:endParaRPr kumimoji="0" lang="en-US"/>
           </a:p>
@@ -3276,7 +3276,7 @@
             <a:fld id="{E4606EA6-EFEA-4C30-9264-4F9291A5780D}" type="datetime1">
               <a:rPr kumimoji="0" lang="en-US" smtClean="0"/>
               <a:pPr/>
-              <a:t>4/8/2015</a:t>
+              <a:t>4/9/2015</a:t>
             </a:fld>
             <a:endParaRPr kumimoji="0" lang="en-US" sz="1400" dirty="0">
               <a:solidFill>
@@ -4207,7 +4207,7 @@
         <p:spPr>
           <a:xfrm>
             <a:off x="152400" y="821331"/>
-            <a:ext cx="4572000" cy="1047979"/>
+            <a:ext cx="4572000" cy="2109808"/>
           </a:xfrm>
           <a:prstGeom prst="rect">
             <a:avLst/>
@@ -4285,8 +4285,52 @@
                 <a:ea typeface="Verdana" panose="020B0604030504040204" pitchFamily="34" charset="0"/>
                 <a:cs typeface="Verdana" panose="020B0604030504040204" pitchFamily="34" charset="0"/>
               </a:rPr>
-              <a:t>(MOC)</a:t>
-            </a:r>
+              <a:t>(MOC GUI)</a:t>
+            </a:r>
+          </a:p>
+          <a:p>
+            <a:pPr algn="ctr">
+              <a:lnSpc>
+                <a:spcPct val="115000"/>
+              </a:lnSpc>
+            </a:pPr>
+            <a:endParaRPr lang="en-US" b="1" dirty="0">
+              <a:latin typeface="Verdana" panose="020B0604030504040204" pitchFamily="34" charset="0"/>
+              <a:ea typeface="Verdana" panose="020B0604030504040204" pitchFamily="34" charset="0"/>
+              <a:cs typeface="Verdana" panose="020B0604030504040204" pitchFamily="34" charset="0"/>
+            </a:endParaRPr>
+          </a:p>
+          <a:p>
+            <a:pPr algn="ctr">
+              <a:lnSpc>
+                <a:spcPct val="115000"/>
+              </a:lnSpc>
+            </a:pPr>
+            <a:endParaRPr lang="en-US" b="1" dirty="0" smtClean="0">
+              <a:latin typeface="Verdana" panose="020B0604030504040204" pitchFamily="34" charset="0"/>
+              <a:ea typeface="Verdana" panose="020B0604030504040204" pitchFamily="34" charset="0"/>
+              <a:cs typeface="Verdana" panose="020B0604030504040204" pitchFamily="34" charset="0"/>
+            </a:endParaRPr>
+          </a:p>
+          <a:p>
+            <a:pPr algn="ctr">
+              <a:lnSpc>
+                <a:spcPct val="115000"/>
+              </a:lnSpc>
+            </a:pPr>
+            <a:endParaRPr lang="en-US" sz="1200" b="1" dirty="0">
+              <a:effectLst/>
+              <a:latin typeface="Verdana" panose="020B0604030504040204" pitchFamily="34" charset="0"/>
+              <a:ea typeface="Verdana" panose="020B0604030504040204" pitchFamily="34" charset="0"/>
+              <a:cs typeface="Verdana" panose="020B0604030504040204" pitchFamily="34" charset="0"/>
+            </a:endParaRPr>
+          </a:p>
+          <a:p>
+            <a:pPr algn="ctr">
+              <a:lnSpc>
+                <a:spcPct val="115000"/>
+              </a:lnSpc>
+            </a:pPr>
             <a:endParaRPr lang="en-US" sz="1200" dirty="0">
               <a:effectLst/>
               <a:latin typeface="Arial" panose="020B0604020202020204" pitchFamily="34" charset="0"/>
@@ -5265,11 +5309,7 @@
           <a:p>
             <a:r>
               <a:rPr lang="en-US" dirty="0" smtClean="0"/>
-              <a:t>Last</a:t>
-            </a:r>
-            <a:r>
-              <a:rPr lang="en-US" dirty="0" smtClean="0"/>
-              <a:t> Sprint</a:t>
+              <a:t>Last Sprint</a:t>
             </a:r>
             <a:endParaRPr lang="en-US" dirty="0"/>
           </a:p>
@@ -5331,21 +5371,8 @@
                   <a:prstClr val="black"/>
                 </a:solidFill>
               </a:rPr>
-              <a:t> </a:t>
-            </a:r>
-            <a:r>
-              <a:rPr lang="en-US" dirty="0" smtClean="0">
-                <a:solidFill>
-                  <a:prstClr val="black"/>
-                </a:solidFill>
-              </a:rPr>
-              <a:t>server</a:t>
-            </a:r>
-            <a:endParaRPr lang="en-US" dirty="0" smtClean="0">
-              <a:solidFill>
-                <a:prstClr val="black"/>
-              </a:solidFill>
-            </a:endParaRPr>
+              <a:t> server</a:t>
+            </a:r>
           </a:p>
           <a:p>
             <a:pPr lvl="0"/>
@@ -5371,7 +5398,61 @@
                   <a:prstClr val="black"/>
                 </a:solidFill>
               </a:rPr>
-              <a:t> API (List all Projects</a:t>
+              <a:t> API (List all Projects)</a:t>
+            </a:r>
+            <a:endParaRPr lang="en-US" dirty="0" smtClean="0"/>
+          </a:p>
+          <a:p>
+            <a:r>
+              <a:rPr lang="en-US" dirty="0" smtClean="0"/>
+              <a:t>Integrated HaaS API calls into web app</a:t>
+            </a:r>
+          </a:p>
+          <a:p>
+            <a:pPr lvl="1"/>
+            <a:r>
+              <a:rPr lang="en-US" dirty="0" smtClean="0"/>
+              <a:t>create/delete projects</a:t>
+            </a:r>
+          </a:p>
+          <a:p>
+            <a:pPr lvl="1"/>
+            <a:r>
+              <a:rPr lang="en-US" dirty="0" smtClean="0"/>
+              <a:t>Get all free nodes</a:t>
+            </a:r>
+          </a:p>
+          <a:p>
+            <a:pPr lvl="1"/>
+            <a:r>
+              <a:rPr lang="en-US" dirty="0" smtClean="0"/>
+              <a:t>Get all projects</a:t>
+            </a:r>
+          </a:p>
+          <a:p>
+            <a:pPr lvl="1"/>
+            <a:r>
+              <a:rPr lang="en-US" dirty="0" smtClean="0"/>
+              <a:t>List project nodes/networks</a:t>
+            </a:r>
+            <a:endParaRPr lang="en-US" dirty="0"/>
+          </a:p>
+          <a:p>
+            <a:r>
+              <a:rPr lang="en-US" dirty="0" smtClean="0">
+                <a:solidFill>
+                  <a:prstClr val="black"/>
+                </a:solidFill>
+              </a:rPr>
+              <a:t>Extended UI </a:t>
+            </a:r>
+            <a:r>
+              <a:rPr lang="en-US" dirty="0">
+                <a:solidFill>
+                  <a:prstClr val="black"/>
+                </a:solidFill>
+              </a:rPr>
+              <a:t>(Django templates, CSS &amp; JavaScript</a:t>
             </a:r>
             <a:r>
               <a:rPr lang="en-US" dirty="0" smtClean="0">
@@ -5381,108 +5462,6 @@
               </a:rPr>
               <a:t>)</a:t>
             </a:r>
-            <a:endParaRPr lang="en-US" dirty="0" smtClean="0"/>
-          </a:p>
-          <a:p>
-            <a:r>
-              <a:rPr lang="en-US" dirty="0" smtClean="0"/>
-              <a:t>Integrated HaaS API calls into web app</a:t>
-            </a:r>
-          </a:p>
-          <a:p>
-            <a:pPr lvl="1"/>
-            <a:r>
-              <a:rPr lang="en-US" dirty="0" smtClean="0"/>
-              <a:t>create/delete projects</a:t>
-            </a:r>
-            <a:endParaRPr lang="en-US" dirty="0" smtClean="0"/>
-          </a:p>
-          <a:p>
-            <a:pPr lvl="1"/>
-            <a:r>
-              <a:rPr lang="en-US" dirty="0" smtClean="0"/>
-              <a:t>Get </a:t>
-            </a:r>
-            <a:r>
-              <a:rPr lang="en-US" dirty="0" smtClean="0"/>
-              <a:t>all free </a:t>
-            </a:r>
-            <a:r>
-              <a:rPr lang="en-US" dirty="0" smtClean="0"/>
-              <a:t>nodes</a:t>
-            </a:r>
-            <a:endParaRPr lang="en-US" dirty="0" smtClean="0"/>
-          </a:p>
-          <a:p>
-            <a:pPr lvl="1"/>
-            <a:r>
-              <a:rPr lang="en-US" dirty="0" smtClean="0"/>
-              <a:t>Get </a:t>
-            </a:r>
-            <a:r>
-              <a:rPr lang="en-US" dirty="0" smtClean="0"/>
-              <a:t>all </a:t>
-            </a:r>
-            <a:r>
-              <a:rPr lang="en-US" dirty="0" smtClean="0"/>
-              <a:t>projects</a:t>
-            </a:r>
-            <a:endParaRPr lang="en-US" dirty="0" smtClean="0"/>
-          </a:p>
-          <a:p>
-            <a:pPr lvl="1"/>
-            <a:r>
-              <a:rPr lang="en-US" dirty="0" smtClean="0"/>
-              <a:t>List </a:t>
-            </a:r>
-            <a:r>
-              <a:rPr lang="en-US" dirty="0" smtClean="0"/>
-              <a:t>project </a:t>
-            </a:r>
-            <a:r>
-              <a:rPr lang="en-US" dirty="0" smtClean="0"/>
-              <a:t>nodes/networks</a:t>
-            </a:r>
-            <a:endParaRPr lang="en-US" dirty="0"/>
-          </a:p>
-          <a:p>
-            <a:r>
-              <a:rPr lang="en-US" dirty="0" smtClean="0">
-                <a:solidFill>
-                  <a:prstClr val="black"/>
-                </a:solidFill>
-              </a:rPr>
-              <a:t>Extended </a:t>
-            </a:r>
-            <a:r>
-              <a:rPr lang="en-US" dirty="0" smtClean="0">
-                <a:solidFill>
-                  <a:prstClr val="black"/>
-                </a:solidFill>
-              </a:rPr>
-              <a:t>UI </a:t>
-            </a:r>
-            <a:r>
-              <a:rPr lang="en-US" dirty="0">
-                <a:solidFill>
-                  <a:prstClr val="black"/>
-                </a:solidFill>
-              </a:rPr>
-              <a:t>(Django templates, CSS &amp; JavaScript</a:t>
-            </a:r>
-            <a:r>
-              <a:rPr lang="en-US" dirty="0" smtClean="0">
-                <a:solidFill>
-                  <a:prstClr val="black"/>
-                </a:solidFill>
-              </a:rPr>
-              <a:t>)</a:t>
-            </a:r>
-            <a:endParaRPr lang="en-US" dirty="0" smtClean="0">
-              <a:solidFill>
-                <a:prstClr val="black"/>
-              </a:solidFill>
-            </a:endParaRPr>
           </a:p>
           <a:p>
             <a:pPr marL="365760" lvl="1" indent="0">
@@ -5570,7 +5549,7 @@
         </p:spPr>
         <p:txBody>
           <a:bodyPr>
-            <a:normAutofit fontScale="77500" lnSpcReduction="20000"/>
+            <a:normAutofit fontScale="70000" lnSpcReduction="20000"/>
           </a:bodyPr>
           <a:lstStyle/>
           <a:p>
@@ -5653,6 +5632,25 @@
               <a:rPr lang="en-US" dirty="0" smtClean="0"/>
               <a:t>app:</a:t>
             </a:r>
+          </a:p>
+          <a:p>
+            <a:pPr lvl="1"/>
+            <a:r>
+              <a:rPr lang="en-US" dirty="0"/>
+              <a:t>(6) Attach </a:t>
+            </a:r>
+            <a:r>
+              <a:rPr lang="en-US" dirty="0" err="1"/>
+              <a:t>Headnode</a:t>
+            </a:r>
+            <a:r>
+              <a:rPr lang="en-US" dirty="0"/>
+              <a:t> to Project [10</a:t>
+            </a:r>
+            <a:r>
+              <a:rPr lang="en-US" dirty="0" smtClean="0"/>
+              <a:t>]</a:t>
+            </a:r>
             <a:endParaRPr lang="en-US" dirty="0"/>
           </a:p>
           <a:p>
@@ -5717,7 +5715,7 @@
                   <a:prstClr val="black"/>
                 </a:solidFill>
               </a:rPr>
-              <a:t>)[?]</a:t>
+              <a:t>)[9]</a:t>
             </a:r>
             <a:endParaRPr lang="en-US" dirty="0">
               <a:solidFill>
@@ -5746,6 +5744,13 @@
   <p:clrMapOvr>
     <a:masterClrMapping/>
   </p:clrMapOvr>
+  <p:timing>
+    <p:tnLst>
+      <p:par>
+        <p:cTn id="1" dur="indefinite" restart="never" nodeType="tmRoot"/>
+      </p:par>
+    </p:tnLst>
+  </p:timing>
 </p:sld>
 </file>
 
@@ -5795,7 +5800,7 @@
       </p:sp>
       <p:pic>
         <p:nvPicPr>
-          <p:cNvPr id="5" name="Picture 4"/>
+          <p:cNvPr id="4" name="Picture 3"/>
           <p:cNvPicPr>
             <a:picLocks noChangeAspect="1"/>
           </p:cNvPicPr>
@@ -5803,13 +5808,13 @@
         </p:nvPicPr>
         <p:blipFill rotWithShape="1">
           <a:blip r:embed="rId2"/>
-          <a:srcRect l="31640" t="31853" r="10937" b="19793"/>
+          <a:srcRect l="31641" t="25001" r="10937" b="15451"/>
           <a:stretch/>
         </p:blipFill>
         <p:spPr>
           <a:xfrm>
-            <a:off x="914400" y="1428750"/>
-            <a:ext cx="7239000" cy="3429000"/>
+            <a:off x="1295400" y="1428750"/>
+            <a:ext cx="6400800" cy="3511550"/>
           </a:xfrm>
           <a:prstGeom prst="rect">
             <a:avLst/>
@@ -5893,6 +5898,13 @@
   <p:clrMapOvr>
     <a:masterClrMapping/>
   </p:clrMapOvr>
+  <p:timing>
+    <p:tnLst>
+      <p:par>
+        <p:cTn id="1" dur="indefinite" restart="never" nodeType="tmRoot"/>
+      </p:par>
+    </p:tnLst>
+  </p:timing>
 </p:sld>
 </file>
 
@@ -5930,11 +5942,7 @@
           <a:p>
             <a:r>
               <a:rPr lang="en-US" dirty="0" smtClean="0"/>
-              <a:t>What’s Next For Sprint </a:t>
-            </a:r>
-            <a:r>
-              <a:rPr lang="en-US" dirty="0" smtClean="0"/>
-              <a:t>4</a:t>
+              <a:t>What’s Next For Sprint 4</a:t>
             </a:r>
             <a:endParaRPr lang="en-US" dirty="0"/>
           </a:p>
@@ -5989,7 +5997,6 @@
               <a:rPr lang="en-US" sz="4100" dirty="0"/>
               <a:t>Project</a:t>
             </a:r>
-            <a:endParaRPr lang="en-US" sz="4100" dirty="0"/>
           </a:p>
           <a:p>
             <a:pPr fontAlgn="base"/>
@@ -6020,7 +6027,6 @@
               <a:rPr lang="en-US" sz="3800" dirty="0"/>
               <a:t>Network</a:t>
             </a:r>
-            <a:endParaRPr lang="en-US" sz="3800" dirty="0"/>
           </a:p>
           <a:p>
             <a:pPr lvl="1" fontAlgn="base"/>
@@ -6144,15 +6150,7 @@
           <a:p>
             <a:r>
               <a:rPr lang="en-US" dirty="0" smtClean="0"/>
-              <a:t>Under Estimated Sprint2 Goals</a:t>
-            </a:r>
-            <a:r>
-              <a:rPr lang="en-US" dirty="0" smtClean="0"/>
-              <a:t>,</a:t>
-            </a:r>
-            <a:r>
-              <a:rPr lang="en-US" dirty="0" smtClean="0"/>
-              <a:t> Over Estimated Sprint3 Goals</a:t>
+              <a:t>Under Estimated Sprint2 Goals, Over Estimated Sprint3 Goals</a:t>
             </a:r>
           </a:p>
           <a:p>

</xml_diff>